<commit_message>
# Updated Reunion Formal 2013-09-30/Reunion formal 2013-09-30.pptx
</commit_message>
<xml_diff>
--- a/docs/Reuniones/Sprint 2/Reunion Formal 2013-09-30/Reunion formal 2013-09-30.pptx
+++ b/docs/Reuniones/Sprint 2/Reunion Formal 2013-09-30/Reunion formal 2013-09-30.pptx
@@ -5,20 +5,19 @@
     <p:sldMasterId id="2147483696" r:id="rId1"/>
   </p:sldMasterIdLst>
   <p:notesMasterIdLst>
-    <p:notesMasterId r:id="rId13"/>
+    <p:notesMasterId r:id="rId12"/>
   </p:notesMasterIdLst>
   <p:sldIdLst>
     <p:sldId id="256" r:id="rId2"/>
     <p:sldId id="257" r:id="rId3"/>
-    <p:sldId id="285" r:id="rId4"/>
-    <p:sldId id="300" r:id="rId5"/>
-    <p:sldId id="260" r:id="rId6"/>
-    <p:sldId id="263" r:id="rId7"/>
-    <p:sldId id="293" r:id="rId8"/>
-    <p:sldId id="295" r:id="rId9"/>
-    <p:sldId id="297" r:id="rId10"/>
-    <p:sldId id="298" r:id="rId11"/>
-    <p:sldId id="299" r:id="rId12"/>
+    <p:sldId id="260" r:id="rId4"/>
+    <p:sldId id="263" r:id="rId5"/>
+    <p:sldId id="293" r:id="rId6"/>
+    <p:sldId id="295" r:id="rId7"/>
+    <p:sldId id="297" r:id="rId8"/>
+    <p:sldId id="298" r:id="rId9"/>
+    <p:sldId id="299" r:id="rId10"/>
+    <p:sldId id="300" r:id="rId11"/>
   </p:sldIdLst>
   <p:sldSz cx="9144000" cy="6858000" type="screen4x3"/>
   <p:notesSz cx="6858000" cy="9144000"/>
@@ -119,7 +118,7 @@
   </p:defaultTextStyle>
   <p:extLst>
     <p:ext uri="{EFAFB233-063F-42B5-8137-9DF3F51BA10A}">
-      <p15:sldGuideLst xmlns:p15="http://schemas.microsoft.com/office/powerpoint/2012/main" xmlns="">
+      <p15:sldGuideLst xmlns:p15="http://schemas.microsoft.com/office/powerpoint/2012/main">
         <p15:guide id="1" orient="horz" pos="2160">
           <p15:clr>
             <a:srgbClr val="A4A3A4"/>
@@ -379,7 +378,7 @@
             <a:fld id="{DAB44264-54AC-4658-AFE4-D5385AA3C409}" type="slidenum">
               <a:rPr lang="es-AR" smtClean="0"/>
               <a:pPr/>
-              <a:t>‹Nº›</a:t>
+              <a:t>‹#›</a:t>
             </a:fld>
             <a:endParaRPr lang="es-AR"/>
           </a:p>
@@ -388,7 +387,7 @@
     </p:spTree>
     <p:extLst>
       <p:ext uri="{BB962C8B-B14F-4D97-AF65-F5344CB8AC3E}">
-        <p14:creationId xmlns:p14="http://schemas.microsoft.com/office/powerpoint/2010/main" xmlns="" val="854811316"/>
+        <p14:creationId xmlns:p14="http://schemas.microsoft.com/office/powerpoint/2010/main" val="854811316"/>
       </p:ext>
     </p:extLst>
   </p:cSld>
@@ -752,7 +751,7 @@
             <a:fld id="{5D54C5B7-6535-45F6-B87D-0A10CE9C57BD}" type="slidenum">
               <a:rPr lang="es-AR" smtClean="0"/>
               <a:pPr/>
-              <a:t>‹Nº›</a:t>
+              <a:t>‹#›</a:t>
             </a:fld>
             <a:endParaRPr lang="es-AR"/>
           </a:p>
@@ -761,7 +760,7 @@
     </p:spTree>
     <p:extLst>
       <p:ext uri="{BB962C8B-B14F-4D97-AF65-F5344CB8AC3E}">
-        <p14:creationId xmlns:p14="http://schemas.microsoft.com/office/powerpoint/2010/main" xmlns="" val="2387916325"/>
+        <p14:creationId xmlns:p14="http://schemas.microsoft.com/office/powerpoint/2010/main" val="2387916325"/>
       </p:ext>
     </p:extLst>
   </p:cSld>
@@ -924,7 +923,7 @@
             <a:fld id="{5D54C5B7-6535-45F6-B87D-0A10CE9C57BD}" type="slidenum">
               <a:rPr lang="es-AR" smtClean="0"/>
               <a:pPr/>
-              <a:t>‹Nº›</a:t>
+              <a:t>‹#›</a:t>
             </a:fld>
             <a:endParaRPr lang="es-AR"/>
           </a:p>
@@ -933,7 +932,7 @@
     </p:spTree>
     <p:extLst>
       <p:ext uri="{BB962C8B-B14F-4D97-AF65-F5344CB8AC3E}">
-        <p14:creationId xmlns:p14="http://schemas.microsoft.com/office/powerpoint/2010/main" xmlns="" val="599926953"/>
+        <p14:creationId xmlns:p14="http://schemas.microsoft.com/office/powerpoint/2010/main" val="599926953"/>
       </p:ext>
     </p:extLst>
   </p:cSld>
@@ -1106,7 +1105,7 @@
             <a:fld id="{5D54C5B7-6535-45F6-B87D-0A10CE9C57BD}" type="slidenum">
               <a:rPr lang="es-AR" smtClean="0"/>
               <a:pPr/>
-              <a:t>‹Nº›</a:t>
+              <a:t>‹#›</a:t>
             </a:fld>
             <a:endParaRPr lang="es-AR"/>
           </a:p>
@@ -1115,7 +1114,7 @@
     </p:spTree>
     <p:extLst>
       <p:ext uri="{BB962C8B-B14F-4D97-AF65-F5344CB8AC3E}">
-        <p14:creationId xmlns:p14="http://schemas.microsoft.com/office/powerpoint/2010/main" xmlns="" val="1132530867"/>
+        <p14:creationId xmlns:p14="http://schemas.microsoft.com/office/powerpoint/2010/main" val="1132530867"/>
       </p:ext>
     </p:extLst>
   </p:cSld>
@@ -1278,7 +1277,7 @@
             <a:fld id="{5D54C5B7-6535-45F6-B87D-0A10CE9C57BD}" type="slidenum">
               <a:rPr lang="es-AR" smtClean="0"/>
               <a:pPr/>
-              <a:t>‹Nº›</a:t>
+              <a:t>‹#›</a:t>
             </a:fld>
             <a:endParaRPr lang="es-AR"/>
           </a:p>
@@ -1287,7 +1286,7 @@
     </p:spTree>
     <p:extLst>
       <p:ext uri="{BB962C8B-B14F-4D97-AF65-F5344CB8AC3E}">
-        <p14:creationId xmlns:p14="http://schemas.microsoft.com/office/powerpoint/2010/main" xmlns="" val="3486428753"/>
+        <p14:creationId xmlns:p14="http://schemas.microsoft.com/office/powerpoint/2010/main" val="3486428753"/>
       </p:ext>
     </p:extLst>
   </p:cSld>
@@ -1536,7 +1535,7 @@
             <a:fld id="{5D54C5B7-6535-45F6-B87D-0A10CE9C57BD}" type="slidenum">
               <a:rPr lang="es-AR" smtClean="0"/>
               <a:pPr/>
-              <a:t>‹Nº›</a:t>
+              <a:t>‹#›</a:t>
             </a:fld>
             <a:endParaRPr lang="es-AR"/>
           </a:p>
@@ -1545,7 +1544,7 @@
     </p:spTree>
     <p:extLst>
       <p:ext uri="{BB962C8B-B14F-4D97-AF65-F5344CB8AC3E}">
-        <p14:creationId xmlns:p14="http://schemas.microsoft.com/office/powerpoint/2010/main" xmlns="" val="2001868568"/>
+        <p14:creationId xmlns:p14="http://schemas.microsoft.com/office/powerpoint/2010/main" val="2001868568"/>
       </p:ext>
     </p:extLst>
   </p:cSld>
@@ -1826,7 +1825,7 @@
             <a:fld id="{5D54C5B7-6535-45F6-B87D-0A10CE9C57BD}" type="slidenum">
               <a:rPr lang="es-AR" smtClean="0"/>
               <a:pPr/>
-              <a:t>‹Nº›</a:t>
+              <a:t>‹#›</a:t>
             </a:fld>
             <a:endParaRPr lang="es-AR"/>
           </a:p>
@@ -1835,7 +1834,7 @@
     </p:spTree>
     <p:extLst>
       <p:ext uri="{BB962C8B-B14F-4D97-AF65-F5344CB8AC3E}">
-        <p14:creationId xmlns:p14="http://schemas.microsoft.com/office/powerpoint/2010/main" xmlns="" val="645645608"/>
+        <p14:creationId xmlns:p14="http://schemas.microsoft.com/office/powerpoint/2010/main" val="645645608"/>
       </p:ext>
     </p:extLst>
   </p:cSld>
@@ -2266,7 +2265,7 @@
             <a:fld id="{5D54C5B7-6535-45F6-B87D-0A10CE9C57BD}" type="slidenum">
               <a:rPr lang="es-AR" smtClean="0"/>
               <a:pPr/>
-              <a:t>‹Nº›</a:t>
+              <a:t>‹#›</a:t>
             </a:fld>
             <a:endParaRPr lang="es-AR"/>
           </a:p>
@@ -2275,7 +2274,7 @@
     </p:spTree>
     <p:extLst>
       <p:ext uri="{BB962C8B-B14F-4D97-AF65-F5344CB8AC3E}">
-        <p14:creationId xmlns:p14="http://schemas.microsoft.com/office/powerpoint/2010/main" xmlns="" val="532310638"/>
+        <p14:creationId xmlns:p14="http://schemas.microsoft.com/office/powerpoint/2010/main" val="532310638"/>
       </p:ext>
     </p:extLst>
   </p:cSld>
@@ -2386,7 +2385,7 @@
             <a:fld id="{5D54C5B7-6535-45F6-B87D-0A10CE9C57BD}" type="slidenum">
               <a:rPr lang="es-AR" smtClean="0"/>
               <a:pPr/>
-              <a:t>‹Nº›</a:t>
+              <a:t>‹#›</a:t>
             </a:fld>
             <a:endParaRPr lang="es-AR"/>
           </a:p>
@@ -2395,7 +2394,7 @@
     </p:spTree>
     <p:extLst>
       <p:ext uri="{BB962C8B-B14F-4D97-AF65-F5344CB8AC3E}">
-        <p14:creationId xmlns:p14="http://schemas.microsoft.com/office/powerpoint/2010/main" xmlns="" val="2854672547"/>
+        <p14:creationId xmlns:p14="http://schemas.microsoft.com/office/powerpoint/2010/main" val="2854672547"/>
       </p:ext>
     </p:extLst>
   </p:cSld>
@@ -2483,7 +2482,7 @@
             <a:fld id="{5D54C5B7-6535-45F6-B87D-0A10CE9C57BD}" type="slidenum">
               <a:rPr lang="es-AR" smtClean="0"/>
               <a:pPr/>
-              <a:t>‹Nº›</a:t>
+              <a:t>‹#›</a:t>
             </a:fld>
             <a:endParaRPr lang="es-AR"/>
           </a:p>
@@ -2492,7 +2491,7 @@
     </p:spTree>
     <p:extLst>
       <p:ext uri="{BB962C8B-B14F-4D97-AF65-F5344CB8AC3E}">
-        <p14:creationId xmlns:p14="http://schemas.microsoft.com/office/powerpoint/2010/main" xmlns="" val="1207526025"/>
+        <p14:creationId xmlns:p14="http://schemas.microsoft.com/office/powerpoint/2010/main" val="1207526025"/>
       </p:ext>
     </p:extLst>
   </p:cSld>
@@ -2851,7 +2850,7 @@
             <a:fld id="{5D54C5B7-6535-45F6-B87D-0A10CE9C57BD}" type="slidenum">
               <a:rPr lang="es-AR" smtClean="0"/>
               <a:pPr/>
-              <a:t>‹Nº›</a:t>
+              <a:t>‹#›</a:t>
             </a:fld>
             <a:endParaRPr lang="es-AR"/>
           </a:p>
@@ -2860,7 +2859,7 @@
     </p:spTree>
     <p:extLst>
       <p:ext uri="{BB962C8B-B14F-4D97-AF65-F5344CB8AC3E}">
-        <p14:creationId xmlns:p14="http://schemas.microsoft.com/office/powerpoint/2010/main" xmlns="" val="692071596"/>
+        <p14:creationId xmlns:p14="http://schemas.microsoft.com/office/powerpoint/2010/main" val="692071596"/>
       </p:ext>
     </p:extLst>
   </p:cSld>
@@ -3182,7 +3181,7 @@
             <a:fld id="{5D54C5B7-6535-45F6-B87D-0A10CE9C57BD}" type="slidenum">
               <a:rPr lang="es-AR" smtClean="0"/>
               <a:pPr/>
-              <a:t>‹Nº›</a:t>
+              <a:t>‹#›</a:t>
             </a:fld>
             <a:endParaRPr lang="es-AR"/>
           </a:p>
@@ -3191,7 +3190,7 @@
     </p:spTree>
     <p:extLst>
       <p:ext uri="{BB962C8B-B14F-4D97-AF65-F5344CB8AC3E}">
-        <p14:creationId xmlns:p14="http://schemas.microsoft.com/office/powerpoint/2010/main" xmlns="" val="975840812"/>
+        <p14:creationId xmlns:p14="http://schemas.microsoft.com/office/powerpoint/2010/main" val="975840812"/>
       </p:ext>
     </p:extLst>
   </p:cSld>
@@ -3437,7 +3436,7 @@
             <a:fld id="{5D54C5B7-6535-45F6-B87D-0A10CE9C57BD}" type="slidenum">
               <a:rPr lang="es-AR" smtClean="0"/>
               <a:pPr/>
-              <a:t>‹Nº›</a:t>
+              <a:t>‹#›</a:t>
             </a:fld>
             <a:endParaRPr lang="es-AR"/>
           </a:p>
@@ -3446,7 +3445,7 @@
     </p:spTree>
     <p:extLst>
       <p:ext uri="{BB962C8B-B14F-4D97-AF65-F5344CB8AC3E}">
-        <p14:creationId xmlns:p14="http://schemas.microsoft.com/office/powerpoint/2010/main" xmlns="" val="4148694763"/>
+        <p14:creationId xmlns:p14="http://schemas.microsoft.com/office/powerpoint/2010/main" val="4148694763"/>
       </p:ext>
     </p:extLst>
   </p:cSld>
@@ -3809,7 +3808,7 @@
         </p:spPr>
         <p:txBody>
           <a:bodyPr>
-            <a:normAutofit/>
+            <a:normAutofit fontScale="90000"/>
           </a:bodyPr>
           <a:lstStyle/>
           <a:p>
@@ -3818,7 +3817,18 @@
               <a:rPr lang="es-AR" dirty="0" err="1" smtClean="0"/>
               <a:t>PhoneTicket</a:t>
             </a:r>
-            <a:endParaRPr lang="es-AR" dirty="0"/>
+            <a:r>
+              <a:rPr lang="es-AR" dirty="0" smtClean="0"/>
+              <a:t/>
+            </a:r>
+            <a:br>
+              <a:rPr lang="es-AR" dirty="0" smtClean="0"/>
+            </a:br>
+            <a:r>
+              <a:rPr lang="es-AR" sz="4000" dirty="0" smtClean="0"/>
+              <a:t>Sprint #2</a:t>
+            </a:r>
+            <a:endParaRPr lang="es-AR" sz="4000" dirty="0"/>
           </a:p>
         </p:txBody>
       </p:sp>
@@ -3987,141 +3997,6 @@
         </p:nvSpPr>
         <p:spPr>
           <a:xfrm>
-            <a:off x="457200" y="214290"/>
-            <a:ext cx="8229600" cy="1143000"/>
-          </a:xfrm>
-        </p:spPr>
-        <p:txBody>
-          <a:bodyPr>
-            <a:normAutofit fontScale="90000"/>
-          </a:bodyPr>
-          <a:lstStyle/>
-          <a:p>
-            <a:pPr algn="ctr"/>
-            <a:r>
-              <a:rPr lang="es-AR" dirty="0" smtClean="0"/>
-              <a:t>Sprint #02 </a:t>
-            </a:r>
-            <a:r>
-              <a:rPr lang="es-AR" sz="3600" dirty="0" smtClean="0"/>
-              <a:t>Creación/Edición de Películas</a:t>
-            </a:r>
-            <a:endParaRPr lang="es-AR" sz="3600" dirty="0"/>
-          </a:p>
-        </p:txBody>
-      </p:sp>
-      <p:sp>
-        <p:nvSpPr>
-          <p:cNvPr id="12290" name="AutoShape 2" descr="mailbox://C:/Users/MATIAS/AppData/Roaming/Thunderbird/Profiles/lffj61ec.default/Mail/pop.googlemail.com/Inbox?number=428921453&amp;part=1.3"/>
-          <p:cNvSpPr>
-            <a:spLocks noChangeAspect="1" noChangeArrowheads="1"/>
-          </p:cNvSpPr>
-          <p:nvPr/>
-        </p:nvSpPr>
-        <p:spPr bwMode="auto">
-          <a:xfrm>
-            <a:off x="155575" y="-4144963"/>
-            <a:ext cx="4867275" cy="8648701"/>
-          </a:xfrm>
-          <a:prstGeom prst="rect">
-            <a:avLst/>
-          </a:prstGeom>
-          <a:noFill/>
-        </p:spPr>
-        <p:txBody>
-          <a:bodyPr vert="horz" wrap="square" lIns="91440" tIns="45720" rIns="91440" bIns="45720" numCol="1" anchor="t" anchorCtr="0" compatLnSpc="1">
-            <a:prstTxWarp prst="textNoShape">
-              <a:avLst/>
-            </a:prstTxWarp>
-          </a:bodyPr>
-          <a:lstStyle/>
-          <a:p>
-            <a:endParaRPr lang="es-AR"/>
-          </a:p>
-        </p:txBody>
-      </p:sp>
-      <p:pic>
-        <p:nvPicPr>
-          <p:cNvPr id="4098" name="Picture 2"/>
-          <p:cNvPicPr>
-            <a:picLocks noChangeAspect="1" noChangeArrowheads="1"/>
-          </p:cNvPicPr>
-          <p:nvPr/>
-        </p:nvPicPr>
-        <p:blipFill>
-          <a:blip r:embed="rId2"/>
-          <a:srcRect/>
-          <a:stretch>
-            <a:fillRect/>
-          </a:stretch>
-        </p:blipFill>
-        <p:spPr bwMode="auto">
-          <a:xfrm>
-            <a:off x="1285852" y="1123950"/>
-            <a:ext cx="6210300" cy="5734050"/>
-          </a:xfrm>
-          <a:prstGeom prst="rect">
-            <a:avLst/>
-          </a:prstGeom>
-          <a:noFill/>
-          <a:ln w="9525">
-            <a:noFill/>
-            <a:miter lim="800000"/>
-            <a:headEnd/>
-            <a:tailEnd/>
-          </a:ln>
-          <a:effectLst/>
-        </p:spPr>
-      </p:pic>
-    </p:spTree>
-    <p:extLst>
-      <p:ext uri="{BB962C8B-B14F-4D97-AF65-F5344CB8AC3E}">
-        <p14:creationId xmlns:p14="http://schemas.microsoft.com/office/powerpoint/2010/main" xmlns="" val="1118828118"/>
-      </p:ext>
-    </p:extLst>
-  </p:cSld>
-  <p:clrMapOvr>
-    <a:masterClrMapping/>
-  </p:clrMapOvr>
-  <p:timing>
-    <p:tnLst>
-      <p:par>
-        <p:cTn id="1" dur="indefinite" restart="never" nodeType="tmRoot"/>
-      </p:par>
-    </p:tnLst>
-  </p:timing>
-</p:sld>
-</file>
-
-<file path=ppt/slides/slide11.xml><?xml version="1.0" encoding="utf-8"?>
-<p:sld xmlns:a="http://schemas.openxmlformats.org/drawingml/2006/main" xmlns:r="http://schemas.openxmlformats.org/officeDocument/2006/relationships" xmlns:p="http://schemas.openxmlformats.org/presentationml/2006/main">
-  <p:cSld>
-    <p:spTree>
-      <p:nvGrpSpPr>
-        <p:cNvPr id="1" name=""/>
-        <p:cNvGrpSpPr/>
-        <p:nvPr/>
-      </p:nvGrpSpPr>
-      <p:grpSpPr>
-        <a:xfrm>
-          <a:off x="0" y="0"/>
-          <a:ext cx="0" cy="0"/>
-          <a:chOff x="0" y="0"/>
-          <a:chExt cx="0" cy="0"/>
-        </a:xfrm>
-      </p:grpSpPr>
-      <p:sp>
-        <p:nvSpPr>
-          <p:cNvPr id="2" name="1 Título"/>
-          <p:cNvSpPr>
-            <a:spLocks noGrp="1"/>
-          </p:cNvSpPr>
-          <p:nvPr>
-            <p:ph type="title"/>
-          </p:nvPr>
-        </p:nvSpPr>
-        <p:spPr>
-          <a:xfrm>
             <a:off x="457200" y="357166"/>
             <a:ext cx="8229600" cy="1143000"/>
           </a:xfrm>
@@ -4133,7 +4008,7 @@
             <a:pPr algn="ctr"/>
             <a:r>
               <a:rPr lang="es-AR" dirty="0" smtClean="0"/>
-              <a:t>Lecciones Aprendidas</a:t>
+              <a:t>Oportunidades de mejora (2)</a:t>
             </a:r>
             <a:endParaRPr lang="es-AR" dirty="0"/>
           </a:p>
@@ -4149,9 +4024,16 @@
             <p:ph idx="1"/>
           </p:nvPr>
         </p:nvSpPr>
-        <p:spPr/>
-        <p:txBody>
-          <a:bodyPr/>
+        <p:spPr>
+          <a:xfrm>
+            <a:off x="507206" y="1268761"/>
+            <a:ext cx="8179594" cy="5400600"/>
+          </a:xfrm>
+        </p:spPr>
+        <p:txBody>
+          <a:bodyPr>
+            <a:normAutofit/>
+          </a:bodyPr>
           <a:lstStyle/>
           <a:p>
             <a:pPr marL="271463" indent="-271463">
@@ -4159,8 +4041,16 @@
               <a:buChar char="•"/>
             </a:pPr>
             <a:r>
-              <a:rPr lang="es-AR" dirty="0" smtClean="0"/>
-              <a:t>Obtener información del esfuerzo real de las tareas para mejorar la estimación.</a:t>
+              <a:rPr lang="es-AR" sz="3200" dirty="0" smtClean="0"/>
+              <a:t>No </a:t>
+            </a:r>
+            <a:r>
+              <a:rPr lang="es-AR" sz="3200" dirty="0" smtClean="0"/>
+              <a:t>realizar trabajo no validado suponiendo por defecto que ante la falta de respuesta se valida el mismo</a:t>
+            </a:r>
+            <a:r>
+              <a:rPr lang="es-AR" sz="3200" dirty="0" smtClean="0"/>
+              <a:t>. Es preferible bloquearse y avisar.</a:t>
             </a:r>
           </a:p>
           <a:p>
@@ -4169,14 +4059,112 @@
               <a:buChar char="•"/>
             </a:pPr>
             <a:r>
-              <a:rPr lang="es-AR" dirty="0" smtClean="0"/>
-              <a:t>No realizar trabajo no validado suponiendo por defecto que ante la falta de respuesta se valida el mismo.</a:t>
-            </a:r>
-            <a:endParaRPr lang="es-AR" dirty="0"/>
+              <a:rPr lang="es-AR" sz="3200" dirty="0" smtClean="0"/>
+              <a:t>Utilizar mensajes </a:t>
+            </a:r>
+            <a:r>
+              <a:rPr lang="es-AR" sz="3200" dirty="0"/>
+              <a:t>separados y se </a:t>
+            </a:r>
+            <a:r>
+              <a:rPr lang="es-AR" sz="3200" dirty="0" smtClean="0"/>
+              <a:t>enviar </a:t>
+            </a:r>
+            <a:r>
+              <a:rPr lang="es-AR" sz="3200" dirty="0"/>
+              <a:t>recordatorios para no quedarnos </a:t>
+            </a:r>
+            <a:r>
+              <a:rPr lang="es-AR" sz="3200" dirty="0" smtClean="0"/>
+              <a:t>bloqueados</a:t>
+            </a:r>
+          </a:p>
+          <a:p>
+            <a:pPr marL="271463" indent="-271463">
+              <a:buFont typeface="Arial" panose="020B0604020202020204" pitchFamily="34" charset="0"/>
+              <a:buChar char="•"/>
+            </a:pPr>
+            <a:r>
+              <a:rPr lang="en-US" sz="3200" dirty="0" err="1" smtClean="0"/>
+              <a:t>Reducir</a:t>
+            </a:r>
+            <a:r>
+              <a:rPr lang="en-US" sz="3200" dirty="0" smtClean="0"/>
+              <a:t> la </a:t>
+            </a:r>
+            <a:r>
+              <a:rPr lang="en-US" sz="3200" dirty="0" err="1" smtClean="0"/>
+              <a:t>cantidad</a:t>
+            </a:r>
+            <a:r>
+              <a:rPr lang="en-US" sz="3200" dirty="0" smtClean="0"/>
+              <a:t> de e-mails de </a:t>
+            </a:r>
+            <a:r>
+              <a:rPr lang="en-US" sz="3200" dirty="0" err="1" smtClean="0"/>
+              <a:t>reporte</a:t>
+            </a:r>
+            <a:r>
+              <a:rPr lang="en-US" sz="3200" dirty="0" smtClean="0"/>
+              <a:t> de </a:t>
+            </a:r>
+            <a:r>
+              <a:rPr lang="en-US" sz="3200" dirty="0" err="1" smtClean="0"/>
+              <a:t>progreso</a:t>
+            </a:r>
+            <a:r>
+              <a:rPr lang="en-US" sz="3200" dirty="0" smtClean="0"/>
+              <a:t>, el </a:t>
+            </a:r>
+            <a:r>
+              <a:rPr lang="en-US" sz="3200" dirty="0" err="1" smtClean="0"/>
+              <a:t>cliente</a:t>
+            </a:r>
+            <a:r>
+              <a:rPr lang="en-US" sz="3200" dirty="0" smtClean="0"/>
+              <a:t> no </a:t>
+            </a:r>
+            <a:r>
+              <a:rPr lang="en-US" sz="3200" dirty="0" err="1" smtClean="0"/>
+              <a:t>llegaba</a:t>
+            </a:r>
+            <a:r>
+              <a:rPr lang="en-US" sz="3200" dirty="0" smtClean="0"/>
+              <a:t> a </a:t>
+            </a:r>
+            <a:r>
+              <a:rPr lang="en-US" sz="3200" dirty="0" err="1" smtClean="0"/>
+              <a:t>consumir</a:t>
+            </a:r>
+            <a:r>
+              <a:rPr lang="en-US" sz="3200" dirty="0" smtClean="0"/>
+              <a:t> </a:t>
+            </a:r>
+            <a:r>
+              <a:rPr lang="en-US" sz="3200" dirty="0" err="1" smtClean="0"/>
+              <a:t>todos</a:t>
+            </a:r>
+            <a:r>
+              <a:rPr lang="en-US" sz="3200" dirty="0" smtClean="0"/>
+              <a:t>.</a:t>
+            </a:r>
+            <a:endParaRPr lang="es-AR" sz="3200" dirty="0"/>
+          </a:p>
+          <a:p>
+            <a:pPr marL="271463" indent="-271463">
+              <a:buFont typeface="Arial" panose="020B0604020202020204" pitchFamily="34" charset="0"/>
+              <a:buChar char="•"/>
+            </a:pPr>
+            <a:endParaRPr lang="es-AR" sz="3200" dirty="0"/>
           </a:p>
         </p:txBody>
       </p:sp>
     </p:spTree>
+    <p:extLst>
+      <p:ext uri="{BB962C8B-B14F-4D97-AF65-F5344CB8AC3E}">
+        <p14:creationId xmlns:p14="http://schemas.microsoft.com/office/powerpoint/2010/main" val="3602608099"/>
+      </p:ext>
+    </p:extLst>
   </p:cSld>
   <p:clrMapOvr>
     <a:masterClrMapping/>
@@ -4230,10 +4218,6 @@
           <a:p>
             <a:pPr algn="ctr"/>
             <a:r>
-              <a:rPr lang="en-US" dirty="0" smtClean="0"/>
-              <a:t>Sprint #02 - </a:t>
-            </a:r>
-            <a:r>
               <a:rPr lang="en-US" dirty="0" err="1" smtClean="0"/>
               <a:t>Objetivos</a:t>
             </a:r>
@@ -4259,7 +4243,7 @@
         </p:spPr>
         <p:txBody>
           <a:bodyPr>
-            <a:normAutofit lnSpcReduction="10000"/>
+            <a:noAutofit/>
           </a:bodyPr>
           <a:lstStyle/>
           <a:p>
@@ -4271,15 +4255,19 @@
               <a:buChar char="ü"/>
             </a:pPr>
             <a:r>
-              <a:rPr lang="es-AR" dirty="0" smtClean="0"/>
-              <a:t>Implementar la funcionalidad de ver información de películas en cartelera (</a:t>
-            </a:r>
-            <a:r>
-              <a:rPr lang="es-AR" dirty="0" err="1" smtClean="0"/>
+              <a:rPr lang="es-AR" sz="3200" dirty="0" smtClean="0"/>
+              <a:t>Ver </a:t>
+            </a:r>
+            <a:r>
+              <a:rPr lang="es-AR" sz="3200" dirty="0" smtClean="0"/>
+              <a:t>información de películas en cartelera (</a:t>
+            </a:r>
+            <a:r>
+              <a:rPr lang="es-AR" sz="3200" dirty="0" err="1" smtClean="0"/>
               <a:t>android</a:t>
             </a:r>
             <a:r>
-              <a:rPr lang="es-AR" dirty="0" smtClean="0"/>
+              <a:rPr lang="es-AR" sz="3200" dirty="0" smtClean="0"/>
               <a:t>)</a:t>
             </a:r>
           </a:p>
@@ -4292,8 +4280,12 @@
               <a:buChar char="ü"/>
             </a:pPr>
             <a:r>
-              <a:rPr lang="es-AR" dirty="0" smtClean="0"/>
-              <a:t>Implementar la funcionalidad de ver lista de películas como administrador</a:t>
+              <a:rPr lang="es-AR" sz="3200" dirty="0" smtClean="0"/>
+              <a:t>Ver </a:t>
+            </a:r>
+            <a:r>
+              <a:rPr lang="es-AR" sz="3200" dirty="0" smtClean="0"/>
+              <a:t>lista de películas como administrador</a:t>
             </a:r>
           </a:p>
           <a:p>
@@ -4305,14 +4297,34 @@
               <a:buChar char="ü"/>
             </a:pPr>
             <a:r>
-              <a:rPr lang="es-AR" dirty="0" smtClean="0"/>
-              <a:t>Implementar la funcionalidad de </a:t>
-            </a:r>
-            <a:r>
-              <a:rPr lang="es-AR" dirty="0" smtClean="0"/>
-              <a:t>crear/editar/eliminar películas como administrador</a:t>
-            </a:r>
-            <a:endParaRPr lang="es-AR" dirty="0" smtClean="0"/>
+              <a:rPr lang="en-US" sz="3200" dirty="0" err="1" smtClean="0"/>
+              <a:t>Listar</a:t>
+            </a:r>
+            <a:r>
+              <a:rPr lang="en-US" sz="3200" dirty="0" smtClean="0"/>
+              <a:t> </a:t>
+            </a:r>
+            <a:r>
+              <a:rPr lang="en-US" sz="3200" dirty="0" err="1" smtClean="0"/>
+              <a:t>películas</a:t>
+            </a:r>
+            <a:r>
+              <a:rPr lang="en-US" sz="3200" dirty="0" smtClean="0"/>
+              <a:t> </a:t>
+            </a:r>
+            <a:r>
+              <a:rPr lang="en-US" sz="3200" dirty="0" err="1" smtClean="0"/>
+              <a:t>como</a:t>
+            </a:r>
+            <a:r>
+              <a:rPr lang="en-US" sz="3200" dirty="0" smtClean="0"/>
+              <a:t> </a:t>
+            </a:r>
+            <a:r>
+              <a:rPr lang="en-US" sz="3200" dirty="0" err="1" smtClean="0"/>
+              <a:t>administrador</a:t>
+            </a:r>
+            <a:endParaRPr lang="es-AR" sz="3200" dirty="0" smtClean="0"/>
           </a:p>
           <a:p>
             <a:pPr>
@@ -4323,16 +4335,12 @@
               <a:buChar char="ü"/>
             </a:pPr>
             <a:r>
-              <a:rPr lang="es-AR" dirty="0" smtClean="0"/>
-              <a:t>Corrección de </a:t>
-            </a:r>
-            <a:r>
-              <a:rPr lang="es-AR" dirty="0" err="1" smtClean="0"/>
-              <a:t>bugs</a:t>
-            </a:r>
-            <a:r>
-              <a:rPr lang="es-AR" dirty="0" smtClean="0"/>
-              <a:t> de la iteración anterior</a:t>
+              <a:rPr lang="es-AR" sz="3200" dirty="0" smtClean="0"/>
+              <a:t>Crear/editar/eliminar </a:t>
+            </a:r>
+            <a:r>
+              <a:rPr lang="es-AR" sz="3200" dirty="0" smtClean="0"/>
+              <a:t>películas como administrador</a:t>
             </a:r>
           </a:p>
           <a:p>
@@ -4344,20 +4352,16 @@
               <a:buChar char="ü"/>
             </a:pPr>
             <a:r>
-              <a:rPr lang="es-AR" dirty="0" smtClean="0"/>
-              <a:t>Realizar una carga de datos </a:t>
-            </a:r>
-            <a:r>
-              <a:rPr lang="es-AR" dirty="0" err="1" smtClean="0"/>
-              <a:t>iniciales</a:t>
-            </a:r>
-            <a:r>
-              <a:rPr lang="es-AR" dirty="0" smtClean="0"/>
-              <a:t> en la base de datos de </a:t>
-            </a:r>
-            <a:r>
-              <a:rPr lang="es-AR" dirty="0" smtClean="0"/>
-              <a:t>películas</a:t>
+              <a:rPr lang="es-AR" sz="3200" dirty="0" smtClean="0"/>
+              <a:t>Corrección de </a:t>
+            </a:r>
+            <a:r>
+              <a:rPr lang="es-AR" sz="3200" dirty="0" err="1" smtClean="0"/>
+              <a:t>bugs</a:t>
+            </a:r>
+            <a:r>
+              <a:rPr lang="es-AR" sz="3200" dirty="0" smtClean="0"/>
+              <a:t> de la iteración anterior</a:t>
             </a:r>
           </a:p>
           <a:p>
@@ -4369,13 +4373,14 @@
               <a:buChar char="ü"/>
             </a:pPr>
             <a:r>
-              <a:rPr lang="es-AR" dirty="0" smtClean="0"/>
-              <a:t>Implementar funcionalidad de búsqueda en la lista de películas del </a:t>
-            </a:r>
-            <a:r>
-              <a:rPr lang="es-AR" dirty="0" smtClean="0"/>
-              <a:t>servidor</a:t>
-            </a:r>
+              <a:rPr lang="es-AR" sz="3200" dirty="0" smtClean="0"/>
+              <a:t>Realizar una carga de datos iniciales en la base de datos de </a:t>
+            </a:r>
+            <a:r>
+              <a:rPr lang="es-AR" sz="3200" dirty="0" smtClean="0"/>
+              <a:t>películas</a:t>
+            </a:r>
+            <a:endParaRPr lang="es-AR" sz="3200" dirty="0" smtClean="0"/>
           </a:p>
         </p:txBody>
       </p:sp>
@@ -4423,103 +4428,84 @@
         </p:nvSpPr>
         <p:spPr>
           <a:xfrm>
-            <a:off x="500034" y="142852"/>
+            <a:off x="428596" y="285728"/>
             <a:ext cx="8229600" cy="1143000"/>
           </a:xfrm>
         </p:spPr>
         <p:txBody>
-          <a:bodyPr>
-            <a:normAutofit fontScale="90000"/>
+          <a:bodyPr/>
+          <a:lstStyle/>
+          <a:p>
+            <a:pPr algn="ctr"/>
+            <a:r>
+              <a:rPr lang="es-AR" dirty="0" err="1" smtClean="0"/>
+              <a:t>BurnDown</a:t>
+            </a:r>
+            <a:r>
+              <a:rPr lang="es-AR" dirty="0" smtClean="0"/>
+              <a:t> </a:t>
+            </a:r>
+            <a:r>
+              <a:rPr lang="es-AR" dirty="0" smtClean="0"/>
+              <a:t>Chart	</a:t>
+            </a:r>
+            <a:endParaRPr lang="es-AR" dirty="0"/>
+          </a:p>
+        </p:txBody>
+      </p:sp>
+      <p:sp>
+        <p:nvSpPr>
+          <p:cNvPr id="1026" name="AutoShape 2" descr="Inline image 2"/>
+          <p:cNvSpPr>
+            <a:spLocks noChangeAspect="1" noChangeArrowheads="1"/>
+          </p:cNvSpPr>
+          <p:nvPr/>
+        </p:nvSpPr>
+        <p:spPr bwMode="auto">
+          <a:xfrm>
+            <a:off x="155575" y="-144463"/>
+            <a:ext cx="304800" cy="304801"/>
+          </a:xfrm>
+          <a:prstGeom prst="rect">
+            <a:avLst/>
+          </a:prstGeom>
+          <a:noFill/>
+        </p:spPr>
+        <p:txBody>
+          <a:bodyPr vert="horz" wrap="square" lIns="91440" tIns="45720" rIns="91440" bIns="45720" numCol="1" anchor="t" anchorCtr="0" compatLnSpc="1">
+            <a:prstTxWarp prst="textNoShape">
+              <a:avLst/>
+            </a:prstTxWarp>
           </a:bodyPr>
           <a:lstStyle/>
           <a:p>
-            <a:pPr algn="ctr"/>
-            <a:r>
-              <a:rPr lang="en-US" dirty="0" smtClean="0"/>
-              <a:t>Sprint #02 – </a:t>
-            </a:r>
-            <a:r>
-              <a:rPr lang="en-US" dirty="0" err="1" smtClean="0"/>
-              <a:t>Pedidos</a:t>
-            </a:r>
-            <a:r>
-              <a:rPr lang="en-US" dirty="0" smtClean="0"/>
-              <a:t> del </a:t>
-            </a:r>
-            <a:r>
-              <a:rPr lang="en-US" dirty="0" err="1" smtClean="0"/>
-              <a:t>cliente</a:t>
-            </a:r>
-            <a:endParaRPr lang="es-AR" dirty="0"/>
-          </a:p>
-        </p:txBody>
-      </p:sp>
-      <p:sp>
-        <p:nvSpPr>
-          <p:cNvPr id="3" name="2 Marcador de contenido"/>
-          <p:cNvSpPr>
-            <a:spLocks noGrp="1"/>
-          </p:cNvSpPr>
-          <p:nvPr>
-            <p:ph idx="1"/>
-          </p:nvPr>
-        </p:nvSpPr>
-        <p:spPr/>
-        <p:txBody>
-          <a:bodyPr/>
-          <a:lstStyle/>
-          <a:p>
-            <a:pPr>
-              <a:buClr>
-                <a:srgbClr val="00B050"/>
-              </a:buClr>
-              <a:buNone/>
-            </a:pPr>
-            <a:r>
-              <a:rPr lang="es-AR" dirty="0" smtClean="0"/>
-              <a:t>Inicialmente estas funcionalidades habían quedado fuera y tras la reunión informal se decidieron agregarlas:</a:t>
-            </a:r>
-          </a:p>
-          <a:p>
-            <a:pPr>
-              <a:buClr>
-                <a:srgbClr val="00B050"/>
-              </a:buClr>
-              <a:buFont typeface="Wingdings" panose="05000000000000000000" pitchFamily="2" charset="2"/>
-              <a:buChar char="ü"/>
-            </a:pPr>
-            <a:r>
-              <a:rPr lang="es-AR" dirty="0" smtClean="0"/>
-              <a:t>Implementar </a:t>
-            </a:r>
-            <a:r>
-              <a:rPr lang="es-AR" dirty="0" smtClean="0"/>
-              <a:t>la funcionalidad de </a:t>
-            </a:r>
-            <a:r>
-              <a:rPr lang="es-AR" dirty="0" smtClean="0"/>
-              <a:t>edición/borrado </a:t>
-            </a:r>
-            <a:r>
-              <a:rPr lang="es-AR" dirty="0" smtClean="0"/>
-              <a:t>de películas</a:t>
-            </a:r>
-          </a:p>
-          <a:p>
-            <a:pPr>
-              <a:buClr>
-                <a:srgbClr val="00B050"/>
-              </a:buClr>
-              <a:buFont typeface="Wingdings" panose="05000000000000000000" pitchFamily="2" charset="2"/>
-              <a:buChar char="ü"/>
-            </a:pPr>
-            <a:r>
-              <a:rPr lang="es-AR" dirty="0" smtClean="0"/>
-              <a:t>Implementar funcionalidad de búsqueda en la lista de películas del servidor</a:t>
-            </a:r>
-          </a:p>
-        </p:txBody>
-      </p:sp>
+            <a:endParaRPr lang="es-AR"/>
+          </a:p>
+        </p:txBody>
+      </p:sp>
+      <p:pic>
+        <p:nvPicPr>
+          <p:cNvPr id="3" name="Picture 2"/>
+          <p:cNvPicPr>
+            <a:picLocks noChangeAspect="1"/>
+          </p:cNvPicPr>
+          <p:nvPr/>
+        </p:nvPicPr>
+        <p:blipFill rotWithShape="1">
+          <a:blip r:embed="rId2"/>
+          <a:srcRect l="2399" t="14559" r="2399" b="10621"/>
+          <a:stretch/>
+        </p:blipFill>
+        <p:spPr>
+          <a:xfrm>
+            <a:off x="42896" y="1844824"/>
+            <a:ext cx="9001000" cy="3977185"/>
+          </a:xfrm>
+          <a:prstGeom prst="rect">
+            <a:avLst/>
+          </a:prstGeom>
+        </p:spPr>
+      </p:pic>
     </p:spTree>
   </p:cSld>
   <p:clrMapOvr>
@@ -4564,260 +4550,6 @@
         </p:nvSpPr>
         <p:spPr>
           <a:xfrm>
-            <a:off x="500034" y="142852"/>
-            <a:ext cx="8229600" cy="1143000"/>
-          </a:xfrm>
-        </p:spPr>
-        <p:txBody>
-          <a:bodyPr>
-            <a:normAutofit/>
-          </a:bodyPr>
-          <a:lstStyle/>
-          <a:p>
-            <a:pPr algn="ctr"/>
-            <a:r>
-              <a:rPr lang="en-US" dirty="0" smtClean="0"/>
-              <a:t>Sprint #02 – </a:t>
-            </a:r>
-            <a:r>
-              <a:rPr lang="en-US" dirty="0" err="1" smtClean="0"/>
-              <a:t>Metodología</a:t>
-            </a:r>
-            <a:endParaRPr lang="es-AR" dirty="0"/>
-          </a:p>
-        </p:txBody>
-      </p:sp>
-      <p:sp>
-        <p:nvSpPr>
-          <p:cNvPr id="3" name="2 Marcador de contenido"/>
-          <p:cNvSpPr>
-            <a:spLocks noGrp="1"/>
-          </p:cNvSpPr>
-          <p:nvPr>
-            <p:ph idx="1"/>
-          </p:nvPr>
-        </p:nvSpPr>
-        <p:spPr/>
-        <p:txBody>
-          <a:bodyPr/>
-          <a:lstStyle/>
-          <a:p>
-            <a:pPr>
-              <a:buClr>
-                <a:srgbClr val="00B050"/>
-              </a:buClr>
-              <a:buNone/>
-            </a:pPr>
-            <a:r>
-              <a:rPr lang="es-AR" dirty="0" smtClean="0"/>
-              <a:t>Luego de la reunión informal, por la no conformidad del cliente con la funcionalidad con la que nos comprometimos decidimos realizar un ajuste en la forma de trabajo:</a:t>
-            </a:r>
-          </a:p>
-          <a:p>
-            <a:pPr>
-              <a:buClr>
-                <a:srgbClr val="00B050"/>
-              </a:buClr>
-              <a:buFont typeface="Wingdings" panose="05000000000000000000" pitchFamily="2" charset="2"/>
-              <a:buChar char="ü"/>
-            </a:pPr>
-            <a:r>
-              <a:rPr lang="es-AR" dirty="0" smtClean="0"/>
-              <a:t>Informes de avance por mail: se perdía mucho tiempo enviando mail con mucho detalle e imágenes.</a:t>
-            </a:r>
-          </a:p>
-          <a:p>
-            <a:pPr>
-              <a:buClr>
-                <a:srgbClr val="00B050"/>
-              </a:buClr>
-              <a:buFont typeface="Wingdings" panose="05000000000000000000" pitchFamily="2" charset="2"/>
-              <a:buChar char="ü"/>
-            </a:pPr>
-            <a:r>
-              <a:rPr lang="es-AR" dirty="0" smtClean="0"/>
-              <a:t>Obtención de validaciones: las validaciones se envían en mensajes separados y se envían recordatorios para no quedarnos bloqueados</a:t>
-            </a:r>
-            <a:endParaRPr lang="es-AR" dirty="0" smtClean="0"/>
-          </a:p>
-        </p:txBody>
-      </p:sp>
-    </p:spTree>
-  </p:cSld>
-  <p:clrMapOvr>
-    <a:masterClrMapping/>
-  </p:clrMapOvr>
-  <p:timing>
-    <p:tnLst>
-      <p:par>
-        <p:cTn id="1" dur="indefinite" restart="never" nodeType="tmRoot"/>
-      </p:par>
-    </p:tnLst>
-  </p:timing>
-</p:sld>
-</file>
-
-<file path=ppt/slides/slide5.xml><?xml version="1.0" encoding="utf-8"?>
-<p:sld xmlns:a="http://schemas.openxmlformats.org/drawingml/2006/main" xmlns:r="http://schemas.openxmlformats.org/officeDocument/2006/relationships" xmlns:p="http://schemas.openxmlformats.org/presentationml/2006/main">
-  <p:cSld>
-    <p:spTree>
-      <p:nvGrpSpPr>
-        <p:cNvPr id="1" name=""/>
-        <p:cNvGrpSpPr/>
-        <p:nvPr/>
-      </p:nvGrpSpPr>
-      <p:grpSpPr>
-        <a:xfrm>
-          <a:off x="0" y="0"/>
-          <a:ext cx="0" cy="0"/>
-          <a:chOff x="0" y="0"/>
-          <a:chExt cx="0" cy="0"/>
-        </a:xfrm>
-      </p:grpSpPr>
-      <p:sp>
-        <p:nvSpPr>
-          <p:cNvPr id="2" name="1 Título"/>
-          <p:cNvSpPr>
-            <a:spLocks noGrp="1"/>
-          </p:cNvSpPr>
-          <p:nvPr>
-            <p:ph type="title"/>
-          </p:nvPr>
-        </p:nvSpPr>
-        <p:spPr>
-          <a:xfrm>
-            <a:off x="428596" y="285728"/>
-            <a:ext cx="8229600" cy="1143000"/>
-          </a:xfrm>
-        </p:spPr>
-        <p:txBody>
-          <a:bodyPr/>
-          <a:lstStyle/>
-          <a:p>
-            <a:pPr algn="ctr"/>
-            <a:r>
-              <a:rPr lang="es-AR" dirty="0" smtClean="0"/>
-              <a:t>Sprint #02 </a:t>
-            </a:r>
-            <a:r>
-              <a:rPr lang="es-AR" dirty="0" err="1" smtClean="0"/>
-              <a:t>BurnDown</a:t>
-            </a:r>
-            <a:r>
-              <a:rPr lang="es-AR" dirty="0" smtClean="0"/>
-              <a:t> Chart	</a:t>
-            </a:r>
-            <a:endParaRPr lang="es-AR" dirty="0"/>
-          </a:p>
-        </p:txBody>
-      </p:sp>
-      <p:sp>
-        <p:nvSpPr>
-          <p:cNvPr id="1026" name="AutoShape 2" descr="Inline image 2"/>
-          <p:cNvSpPr>
-            <a:spLocks noChangeAspect="1" noChangeArrowheads="1"/>
-          </p:cNvSpPr>
-          <p:nvPr/>
-        </p:nvSpPr>
-        <p:spPr bwMode="auto">
-          <a:xfrm>
-            <a:off x="155575" y="-144463"/>
-            <a:ext cx="304800" cy="304801"/>
-          </a:xfrm>
-          <a:prstGeom prst="rect">
-            <a:avLst/>
-          </a:prstGeom>
-          <a:noFill/>
-        </p:spPr>
-        <p:txBody>
-          <a:bodyPr vert="horz" wrap="square" lIns="91440" tIns="45720" rIns="91440" bIns="45720" numCol="1" anchor="t" anchorCtr="0" compatLnSpc="1">
-            <a:prstTxWarp prst="textNoShape">
-              <a:avLst/>
-            </a:prstTxWarp>
-          </a:bodyPr>
-          <a:lstStyle/>
-          <a:p>
-            <a:endParaRPr lang="es-AR"/>
-          </a:p>
-        </p:txBody>
-      </p:sp>
-      <p:pic>
-        <p:nvPicPr>
-          <p:cNvPr id="2051" name="Picture 3"/>
-          <p:cNvPicPr>
-            <a:picLocks noChangeAspect="1" noChangeArrowheads="1"/>
-          </p:cNvPicPr>
-          <p:nvPr/>
-        </p:nvPicPr>
-        <p:blipFill>
-          <a:blip r:embed="rId2"/>
-          <a:srcRect/>
-          <a:stretch>
-            <a:fillRect/>
-          </a:stretch>
-        </p:blipFill>
-        <p:spPr bwMode="auto">
-          <a:xfrm>
-            <a:off x="0" y="1850810"/>
-            <a:ext cx="9144000" cy="4145177"/>
-          </a:xfrm>
-          <a:prstGeom prst="rect">
-            <a:avLst/>
-          </a:prstGeom>
-          <a:noFill/>
-          <a:ln w="9525">
-            <a:noFill/>
-            <a:miter lim="800000"/>
-            <a:headEnd/>
-            <a:tailEnd/>
-          </a:ln>
-          <a:effectLst/>
-        </p:spPr>
-      </p:pic>
-    </p:spTree>
-  </p:cSld>
-  <p:clrMapOvr>
-    <a:masterClrMapping/>
-  </p:clrMapOvr>
-  <p:timing>
-    <p:tnLst>
-      <p:par>
-        <p:cTn id="1" dur="indefinite" restart="never" nodeType="tmRoot"/>
-      </p:par>
-    </p:tnLst>
-  </p:timing>
-</p:sld>
-</file>
-
-<file path=ppt/slides/slide6.xml><?xml version="1.0" encoding="utf-8"?>
-<p:sld xmlns:a="http://schemas.openxmlformats.org/drawingml/2006/main" xmlns:r="http://schemas.openxmlformats.org/officeDocument/2006/relationships" xmlns:p="http://schemas.openxmlformats.org/presentationml/2006/main">
-  <p:cSld>
-    <p:spTree>
-      <p:nvGrpSpPr>
-        <p:cNvPr id="1" name=""/>
-        <p:cNvGrpSpPr/>
-        <p:nvPr/>
-      </p:nvGrpSpPr>
-      <p:grpSpPr>
-        <a:xfrm>
-          <a:off x="0" y="0"/>
-          <a:ext cx="0" cy="0"/>
-          <a:chOff x="0" y="0"/>
-          <a:chExt cx="0" cy="0"/>
-        </a:xfrm>
-      </p:grpSpPr>
-      <p:sp>
-        <p:nvSpPr>
-          <p:cNvPr id="2" name="1 Título"/>
-          <p:cNvSpPr>
-            <a:spLocks noGrp="1"/>
-          </p:cNvSpPr>
-          <p:nvPr>
-            <p:ph type="title"/>
-          </p:nvPr>
-        </p:nvSpPr>
-        <p:spPr>
-          <a:xfrm>
             <a:off x="457200" y="214290"/>
             <a:ext cx="8229600" cy="1143000"/>
           </a:xfrm>
@@ -4829,7 +4561,7 @@
             <a:pPr algn="ctr"/>
             <a:r>
               <a:rPr lang="es-AR" dirty="0" smtClean="0"/>
-              <a:t>Sprint #02 Riesgos</a:t>
+              <a:t>Riesgos</a:t>
             </a:r>
             <a:endParaRPr lang="es-AR" dirty="0"/>
           </a:p>
@@ -4883,7 +4615,7 @@
 </p:sld>
 </file>
 
-<file path=ppt/slides/slide7.xml><?xml version="1.0" encoding="utf-8"?>
+<file path=ppt/slides/slide5.xml><?xml version="1.0" encoding="utf-8"?>
 <p:sld xmlns:a="http://schemas.openxmlformats.org/drawingml/2006/main" xmlns:r="http://schemas.openxmlformats.org/officeDocument/2006/relationships" xmlns:p="http://schemas.openxmlformats.org/presentationml/2006/main">
   <p:cSld>
     <p:spTree>
@@ -4923,7 +4655,11 @@
             <a:pPr algn="ctr"/>
             <a:r>
               <a:rPr lang="es-AR" dirty="0" smtClean="0"/>
-              <a:t>Sprint #02 Plan de riesgos</a:t>
+              <a:t>Plan </a:t>
+            </a:r>
+            <a:r>
+              <a:rPr lang="es-AR" dirty="0" smtClean="0"/>
+              <a:t>de riesgos</a:t>
             </a:r>
             <a:endParaRPr lang="es-AR" dirty="0"/>
           </a:p>
@@ -4977,7 +4713,7 @@
 </p:sld>
 </file>
 
-<file path=ppt/slides/slide8.xml><?xml version="1.0" encoding="utf-8"?>
+<file path=ppt/slides/slide6.xml><?xml version="1.0" encoding="utf-8"?>
 <p:sld xmlns:a="http://schemas.openxmlformats.org/drawingml/2006/main" xmlns:r="http://schemas.openxmlformats.org/officeDocument/2006/relationships" xmlns:p="http://schemas.openxmlformats.org/presentationml/2006/main">
   <p:cSld>
     <p:spTree>
@@ -5017,10 +4753,10 @@
             <a:pPr algn="ctr"/>
             <a:r>
               <a:rPr lang="es-AR" dirty="0" smtClean="0"/>
-              <a:t>Sprint #02 Cliente </a:t>
-            </a:r>
-            <a:r>
-              <a:rPr lang="es-AR" dirty="0" err="1" smtClean="0"/>
+              <a:t>Cliente </a:t>
+            </a:r>
+            <a:r>
+              <a:rPr lang="es-AR" dirty="0" smtClean="0"/>
               <a:t>Android</a:t>
             </a:r>
             <a:endParaRPr lang="es-AR" dirty="0"/>
@@ -5150,7 +4886,7 @@
 </p:sld>
 </file>
 
-<file path=ppt/slides/slide9.xml><?xml version="1.0" encoding="utf-8"?>
+<file path=ppt/slides/slide7.xml><?xml version="1.0" encoding="utf-8"?>
 <p:sld xmlns:a="http://schemas.openxmlformats.org/drawingml/2006/main" xmlns:r="http://schemas.openxmlformats.org/officeDocument/2006/relationships" xmlns:p="http://schemas.openxmlformats.org/presentationml/2006/main">
   <p:cSld>
     <p:spTree>
@@ -5190,7 +4926,11 @@
             <a:pPr algn="ctr"/>
             <a:r>
               <a:rPr lang="es-AR" dirty="0" smtClean="0"/>
-              <a:t>Sprint #02 Lista Películas</a:t>
+              <a:t>Lista </a:t>
+            </a:r>
+            <a:r>
+              <a:rPr lang="es-AR" dirty="0" smtClean="0"/>
+              <a:t>Películas</a:t>
             </a:r>
             <a:endParaRPr lang="es-AR" dirty="0"/>
           </a:p>
@@ -5262,9 +5002,412 @@
     </p:spTree>
     <p:extLst>
       <p:ext uri="{BB962C8B-B14F-4D97-AF65-F5344CB8AC3E}">
-        <p14:creationId xmlns:p14="http://schemas.microsoft.com/office/powerpoint/2010/main" xmlns="" val="3682612548"/>
+        <p14:creationId xmlns:p14="http://schemas.microsoft.com/office/powerpoint/2010/main" val="3682612548"/>
       </p:ext>
     </p:extLst>
+  </p:cSld>
+  <p:clrMapOvr>
+    <a:masterClrMapping/>
+  </p:clrMapOvr>
+  <p:timing>
+    <p:tnLst>
+      <p:par>
+        <p:cTn id="1" dur="indefinite" restart="never" nodeType="tmRoot"/>
+      </p:par>
+    </p:tnLst>
+  </p:timing>
+</p:sld>
+</file>
+
+<file path=ppt/slides/slide8.xml><?xml version="1.0" encoding="utf-8"?>
+<p:sld xmlns:a="http://schemas.openxmlformats.org/drawingml/2006/main" xmlns:r="http://schemas.openxmlformats.org/officeDocument/2006/relationships" xmlns:p="http://schemas.openxmlformats.org/presentationml/2006/main">
+  <p:cSld>
+    <p:spTree>
+      <p:nvGrpSpPr>
+        <p:cNvPr id="1" name=""/>
+        <p:cNvGrpSpPr/>
+        <p:nvPr/>
+      </p:nvGrpSpPr>
+      <p:grpSpPr>
+        <a:xfrm>
+          <a:off x="0" y="0"/>
+          <a:ext cx="0" cy="0"/>
+          <a:chOff x="0" y="0"/>
+          <a:chExt cx="0" cy="0"/>
+        </a:xfrm>
+      </p:grpSpPr>
+      <p:sp>
+        <p:nvSpPr>
+          <p:cNvPr id="2" name="1 Título"/>
+          <p:cNvSpPr>
+            <a:spLocks noGrp="1"/>
+          </p:cNvSpPr>
+          <p:nvPr>
+            <p:ph type="title"/>
+          </p:nvPr>
+        </p:nvSpPr>
+        <p:spPr>
+          <a:xfrm>
+            <a:off x="457200" y="214290"/>
+            <a:ext cx="8229600" cy="1143000"/>
+          </a:xfrm>
+        </p:spPr>
+        <p:txBody>
+          <a:bodyPr>
+            <a:normAutofit/>
+          </a:bodyPr>
+          <a:lstStyle/>
+          <a:p>
+            <a:pPr algn="ctr"/>
+            <a:r>
+              <a:rPr lang="es-AR" dirty="0" smtClean="0"/>
+              <a:t>Creación/Edición </a:t>
+            </a:r>
+            <a:r>
+              <a:rPr lang="es-AR" dirty="0" smtClean="0"/>
+              <a:t>de Películas</a:t>
+            </a:r>
+            <a:endParaRPr lang="es-AR" dirty="0"/>
+          </a:p>
+        </p:txBody>
+      </p:sp>
+      <p:sp>
+        <p:nvSpPr>
+          <p:cNvPr id="12290" name="AutoShape 2" descr="mailbox://C:/Users/MATIAS/AppData/Roaming/Thunderbird/Profiles/lffj61ec.default/Mail/pop.googlemail.com/Inbox?number=428921453&amp;part=1.3"/>
+          <p:cNvSpPr>
+            <a:spLocks noChangeAspect="1" noChangeArrowheads="1"/>
+          </p:cNvSpPr>
+          <p:nvPr/>
+        </p:nvSpPr>
+        <p:spPr bwMode="auto">
+          <a:xfrm>
+            <a:off x="155575" y="-4144963"/>
+            <a:ext cx="4867275" cy="8648701"/>
+          </a:xfrm>
+          <a:prstGeom prst="rect">
+            <a:avLst/>
+          </a:prstGeom>
+          <a:noFill/>
+        </p:spPr>
+        <p:txBody>
+          <a:bodyPr vert="horz" wrap="square" lIns="91440" tIns="45720" rIns="91440" bIns="45720" numCol="1" anchor="t" anchorCtr="0" compatLnSpc="1">
+            <a:prstTxWarp prst="textNoShape">
+              <a:avLst/>
+            </a:prstTxWarp>
+          </a:bodyPr>
+          <a:lstStyle/>
+          <a:p>
+            <a:endParaRPr lang="es-AR"/>
+          </a:p>
+        </p:txBody>
+      </p:sp>
+      <p:pic>
+        <p:nvPicPr>
+          <p:cNvPr id="4098" name="Picture 2"/>
+          <p:cNvPicPr>
+            <a:picLocks noChangeAspect="1" noChangeArrowheads="1"/>
+          </p:cNvPicPr>
+          <p:nvPr/>
+        </p:nvPicPr>
+        <p:blipFill>
+          <a:blip r:embed="rId2"/>
+          <a:srcRect/>
+          <a:stretch>
+            <a:fillRect/>
+          </a:stretch>
+        </p:blipFill>
+        <p:spPr bwMode="auto">
+          <a:xfrm>
+            <a:off x="1285852" y="1123950"/>
+            <a:ext cx="6210300" cy="5734050"/>
+          </a:xfrm>
+          <a:prstGeom prst="rect">
+            <a:avLst/>
+          </a:prstGeom>
+          <a:noFill/>
+          <a:ln w="9525">
+            <a:noFill/>
+            <a:miter lim="800000"/>
+            <a:headEnd/>
+            <a:tailEnd/>
+          </a:ln>
+          <a:effectLst/>
+        </p:spPr>
+      </p:pic>
+    </p:spTree>
+    <p:extLst>
+      <p:ext uri="{BB962C8B-B14F-4D97-AF65-F5344CB8AC3E}">
+        <p14:creationId xmlns:p14="http://schemas.microsoft.com/office/powerpoint/2010/main" val="1118828118"/>
+      </p:ext>
+    </p:extLst>
+  </p:cSld>
+  <p:clrMapOvr>
+    <a:masterClrMapping/>
+  </p:clrMapOvr>
+  <p:timing>
+    <p:tnLst>
+      <p:par>
+        <p:cTn id="1" dur="indefinite" restart="never" nodeType="tmRoot"/>
+      </p:par>
+    </p:tnLst>
+  </p:timing>
+</p:sld>
+</file>
+
+<file path=ppt/slides/slide9.xml><?xml version="1.0" encoding="utf-8"?>
+<p:sld xmlns:a="http://schemas.openxmlformats.org/drawingml/2006/main" xmlns:r="http://schemas.openxmlformats.org/officeDocument/2006/relationships" xmlns:p="http://schemas.openxmlformats.org/presentationml/2006/main">
+  <p:cSld>
+    <p:spTree>
+      <p:nvGrpSpPr>
+        <p:cNvPr id="1" name=""/>
+        <p:cNvGrpSpPr/>
+        <p:nvPr/>
+      </p:nvGrpSpPr>
+      <p:grpSpPr>
+        <a:xfrm>
+          <a:off x="0" y="0"/>
+          <a:ext cx="0" cy="0"/>
+          <a:chOff x="0" y="0"/>
+          <a:chExt cx="0" cy="0"/>
+        </a:xfrm>
+      </p:grpSpPr>
+      <p:sp>
+        <p:nvSpPr>
+          <p:cNvPr id="2" name="1 Título"/>
+          <p:cNvSpPr>
+            <a:spLocks noGrp="1"/>
+          </p:cNvSpPr>
+          <p:nvPr>
+            <p:ph type="title"/>
+          </p:nvPr>
+        </p:nvSpPr>
+        <p:spPr>
+          <a:xfrm>
+            <a:off x="457200" y="357166"/>
+            <a:ext cx="8229600" cy="1143000"/>
+          </a:xfrm>
+        </p:spPr>
+        <p:txBody>
+          <a:bodyPr/>
+          <a:lstStyle/>
+          <a:p>
+            <a:pPr algn="ctr"/>
+            <a:r>
+              <a:rPr lang="es-AR" dirty="0" smtClean="0"/>
+              <a:t>Oportunidades de mejora (1)</a:t>
+            </a:r>
+            <a:endParaRPr lang="es-AR" dirty="0"/>
+          </a:p>
+        </p:txBody>
+      </p:sp>
+      <p:sp>
+        <p:nvSpPr>
+          <p:cNvPr id="3" name="2 Marcador de contenido"/>
+          <p:cNvSpPr>
+            <a:spLocks noGrp="1"/>
+          </p:cNvSpPr>
+          <p:nvPr>
+            <p:ph idx="1"/>
+          </p:nvPr>
+        </p:nvSpPr>
+        <p:spPr>
+          <a:xfrm>
+            <a:off x="507206" y="1268761"/>
+            <a:ext cx="8179594" cy="5400600"/>
+          </a:xfrm>
+        </p:spPr>
+        <p:txBody>
+          <a:bodyPr>
+            <a:normAutofit/>
+          </a:bodyPr>
+          <a:lstStyle/>
+          <a:p>
+            <a:pPr marL="271463" indent="-271463">
+              <a:buFont typeface="Arial" panose="020B0604020202020204" pitchFamily="34" charset="0"/>
+              <a:buChar char="•"/>
+            </a:pPr>
+            <a:r>
+              <a:rPr lang="en-US" sz="3200" dirty="0" err="1" smtClean="0"/>
+              <a:t>Objetivo</a:t>
+            </a:r>
+            <a:r>
+              <a:rPr lang="en-US" sz="3200" dirty="0" smtClean="0"/>
+              <a:t> reunions </a:t>
+            </a:r>
+            <a:r>
+              <a:rPr lang="en-US" sz="3200" dirty="0" err="1" smtClean="0"/>
+              <a:t>planeamiento</a:t>
+            </a:r>
+            <a:r>
+              <a:rPr lang="en-US" sz="3200" dirty="0" smtClean="0"/>
+              <a:t>: </a:t>
+            </a:r>
+          </a:p>
+          <a:p>
+            <a:pPr marL="971550" lvl="2" indent="-514350">
+              <a:buFont typeface="+mj-lt"/>
+              <a:buAutoNum type="arabicPeriod"/>
+            </a:pPr>
+            <a:r>
+              <a:rPr lang="en-US" sz="2800" dirty="0" err="1"/>
+              <a:t>P</a:t>
+            </a:r>
+            <a:r>
+              <a:rPr lang="en-US" sz="2800" dirty="0" err="1" smtClean="0"/>
+              <a:t>rioridades</a:t>
+            </a:r>
+            <a:r>
+              <a:rPr lang="en-US" sz="2800" dirty="0" smtClean="0"/>
+              <a:t> de alto </a:t>
+            </a:r>
+            <a:r>
+              <a:rPr lang="en-US" sz="2800" dirty="0" err="1" smtClean="0"/>
+              <a:t>nivel</a:t>
+            </a:r>
+            <a:r>
+              <a:rPr lang="en-US" sz="2800" dirty="0" smtClean="0"/>
+              <a:t> </a:t>
+            </a:r>
+            <a:r>
+              <a:rPr lang="en-US" sz="2800" dirty="0" err="1" smtClean="0"/>
+              <a:t>definidas</a:t>
+            </a:r>
+            <a:endParaRPr lang="en-US" sz="2800" dirty="0" smtClean="0"/>
+          </a:p>
+          <a:p>
+            <a:pPr marL="971550" lvl="2" indent="-514350">
+              <a:buFont typeface="+mj-lt"/>
+              <a:buAutoNum type="arabicPeriod"/>
+            </a:pPr>
+            <a:r>
+              <a:rPr lang="en-US" sz="2800" dirty="0" smtClean="0"/>
+              <a:t>Mockups simples (</a:t>
+            </a:r>
+            <a:r>
+              <a:rPr lang="en-US" sz="2800" dirty="0" err="1" smtClean="0"/>
+              <a:t>ej</a:t>
+            </a:r>
+            <a:r>
+              <a:rPr lang="en-US" sz="2800" dirty="0" smtClean="0"/>
+              <a:t>: </a:t>
+            </a:r>
+            <a:r>
+              <a:rPr lang="en-US" sz="2800" dirty="0" err="1" smtClean="0"/>
+              <a:t>papel</a:t>
+            </a:r>
+            <a:r>
+              <a:rPr lang="en-US" sz="2800" dirty="0" smtClean="0"/>
+              <a:t>) </a:t>
+            </a:r>
+            <a:r>
+              <a:rPr lang="en-US" sz="2800" dirty="0" err="1" smtClean="0"/>
+              <a:t>aprobados</a:t>
+            </a:r>
+            <a:endParaRPr lang="en-US" sz="2800" dirty="0" smtClean="0"/>
+          </a:p>
+          <a:p>
+            <a:pPr marL="971550" lvl="2" indent="-514350">
+              <a:buFont typeface="+mj-lt"/>
+              <a:buAutoNum type="arabicPeriod"/>
+            </a:pPr>
+            <a:r>
+              <a:rPr lang="en-US" sz="2800" dirty="0" err="1" smtClean="0"/>
+              <a:t>Criterios</a:t>
+            </a:r>
+            <a:r>
+              <a:rPr lang="en-US" sz="2800" dirty="0" smtClean="0"/>
+              <a:t> de </a:t>
+            </a:r>
+            <a:r>
+              <a:rPr lang="en-US" sz="2800" dirty="0" err="1" smtClean="0"/>
+              <a:t>aceptación</a:t>
+            </a:r>
+            <a:r>
+              <a:rPr lang="en-US" sz="2800" dirty="0" smtClean="0"/>
+              <a:t> </a:t>
+            </a:r>
+            <a:r>
+              <a:rPr lang="en-US" sz="2800" dirty="0" err="1" smtClean="0"/>
+              <a:t>mínimos</a:t>
+            </a:r>
+            <a:r>
+              <a:rPr lang="en-US" sz="2800" dirty="0" smtClean="0"/>
+              <a:t> </a:t>
+            </a:r>
+            <a:r>
+              <a:rPr lang="en-US" sz="2800" dirty="0" err="1" smtClean="0"/>
+              <a:t>establecidos</a:t>
+            </a:r>
+            <a:r>
+              <a:rPr lang="en-US" sz="2800" dirty="0" smtClean="0"/>
+              <a:t> </a:t>
+            </a:r>
+            <a:r>
+              <a:rPr lang="en-US" sz="2800" dirty="0" err="1" smtClean="0"/>
+              <a:t>por</a:t>
+            </a:r>
+            <a:r>
+              <a:rPr lang="en-US" sz="2800" dirty="0" smtClean="0"/>
+              <a:t> el </a:t>
+            </a:r>
+            <a:r>
+              <a:rPr lang="en-US" sz="2800" dirty="0" err="1" smtClean="0"/>
+              <a:t>cliente</a:t>
+            </a:r>
+            <a:r>
+              <a:rPr lang="en-US" sz="2800" dirty="0" smtClean="0"/>
+              <a:t>.</a:t>
+            </a:r>
+          </a:p>
+          <a:p>
+            <a:pPr marL="971550" lvl="2" indent="-514350">
+              <a:buFont typeface="+mj-lt"/>
+              <a:buAutoNum type="arabicPeriod"/>
+            </a:pPr>
+            <a:r>
+              <a:rPr lang="en-US" sz="2800" dirty="0" err="1" smtClean="0"/>
+              <a:t>Modelo</a:t>
+            </a:r>
+            <a:r>
+              <a:rPr lang="en-US" sz="2800" dirty="0" smtClean="0"/>
+              <a:t> </a:t>
+            </a:r>
+            <a:r>
+              <a:rPr lang="en-US" sz="2800" dirty="0" err="1" smtClean="0"/>
+              <a:t>básico</a:t>
+            </a:r>
+            <a:r>
+              <a:rPr lang="en-US" sz="2800" dirty="0" smtClean="0"/>
+              <a:t> </a:t>
+            </a:r>
+            <a:r>
+              <a:rPr lang="en-US" sz="2800" dirty="0" err="1" smtClean="0"/>
+              <a:t>definido</a:t>
+            </a:r>
+            <a:endParaRPr lang="es-AR" sz="2800" dirty="0" smtClean="0"/>
+          </a:p>
+          <a:p>
+            <a:pPr marL="271463" indent="-271463">
+              <a:buFont typeface="Arial" panose="020B0604020202020204" pitchFamily="34" charset="0"/>
+              <a:buChar char="•"/>
+            </a:pPr>
+            <a:r>
+              <a:rPr lang="es-AR" sz="3200" dirty="0" smtClean="0"/>
+              <a:t>Obtener </a:t>
+            </a:r>
+            <a:r>
+              <a:rPr lang="es-AR" sz="3200" dirty="0" smtClean="0"/>
+              <a:t>información del esfuerzo real de las tareas para mejorar la estimación</a:t>
+            </a:r>
+            <a:r>
+              <a:rPr lang="es-AR" sz="3200" dirty="0" smtClean="0"/>
+              <a:t>.</a:t>
+            </a:r>
+            <a:endParaRPr lang="es-AR" sz="3200" dirty="0" smtClean="0"/>
+          </a:p>
+        </p:txBody>
+      </p:sp>
+    </p:spTree>
   </p:cSld>
   <p:clrMapOvr>
     <a:masterClrMapping/>
@@ -5510,7 +5653,7 @@
   <a:extraClrSchemeLst/>
   <a:extLst>
     <a:ext uri="{05A4C25C-085E-4340-85A3-A5531E510DB2}">
-      <thm15:themeFamily xmlns:thm15="http://schemas.microsoft.com/office/thememl/2012/main" xmlns="" name="Metropolitan" id="{4C5440D6-04D2-4954-96CF-F251137069B2}" vid="{79CFCA13-9412-4290-BB4B-85112F88857B}"/>
+      <thm15:themeFamily xmlns:thm15="http://schemas.microsoft.com/office/thememl/2012/main" name="Metropolitan" id="{4C5440D6-04D2-4954-96CF-F251137069B2}" vid="{79CFCA13-9412-4290-BB4B-85112F88857B}"/>
     </a:ext>
   </a:extLst>
 </a:theme>
@@ -5771,7 +5914,7 @@
   <a:extraClrSchemeLst/>
   <a:extLst>
     <a:ext uri="{05A4C25C-085E-4340-85A3-A5531E510DB2}">
-      <thm15:themeFamily xmlns:thm15="http://schemas.microsoft.com/office/thememl/2012/main" xmlns="" name="Office Theme" id="{62F939B6-93AF-4DB8-9C6B-D6C7DFDC589F}" vid="{4A3C46E8-61CC-4603-A589-7422A47A8E4A}"/>
+      <thm15:themeFamily xmlns:thm15="http://schemas.microsoft.com/office/thememl/2012/main" name="Office Theme" id="{62F939B6-93AF-4DB8-9C6B-D6C7DFDC589F}" vid="{4A3C46E8-61CC-4603-A589-7422A47A8E4A}"/>
     </a:ext>
   </a:extLst>
 </a:theme>

</xml_diff>

<commit_message>
#Fixed "Reunion Formal" Typos
</commit_message>
<xml_diff>
--- a/docs/Reuniones/Sprint 2/Reunion Formal 2013-09-30/Reunion formal 2013-09-30.pptx
+++ b/docs/Reuniones/Sprint 2/Reunion Formal 2013-09-30/Reunion formal 2013-09-30.pptx
@@ -118,7 +118,7 @@
   </p:defaultTextStyle>
   <p:extLst>
     <p:ext uri="{EFAFB233-063F-42B5-8137-9DF3F51BA10A}">
-      <p15:sldGuideLst xmlns:p15="http://schemas.microsoft.com/office/powerpoint/2012/main" xmlns="">
+      <p15:sldGuideLst xmlns:p15="http://schemas.microsoft.com/office/powerpoint/2012/main">
         <p15:guide id="1" orient="horz" pos="2160">
           <p15:clr>
             <a:srgbClr val="A4A3A4"/>
@@ -378,7 +378,7 @@
             <a:fld id="{DAB44264-54AC-4658-AFE4-D5385AA3C409}" type="slidenum">
               <a:rPr lang="es-AR" smtClean="0"/>
               <a:pPr/>
-              <a:t>‹Nº›</a:t>
+              <a:t>‹#›</a:t>
             </a:fld>
             <a:endParaRPr lang="es-AR"/>
           </a:p>
@@ -387,7 +387,7 @@
     </p:spTree>
     <p:extLst>
       <p:ext uri="{BB962C8B-B14F-4D97-AF65-F5344CB8AC3E}">
-        <p14:creationId xmlns:p14="http://schemas.microsoft.com/office/powerpoint/2010/main" xmlns="" val="854811316"/>
+        <p14:creationId xmlns:p14="http://schemas.microsoft.com/office/powerpoint/2010/main" val="854811316"/>
       </p:ext>
     </p:extLst>
   </p:cSld>
@@ -751,7 +751,7 @@
             <a:fld id="{5D54C5B7-6535-45F6-B87D-0A10CE9C57BD}" type="slidenum">
               <a:rPr lang="es-AR" smtClean="0"/>
               <a:pPr/>
-              <a:t>‹Nº›</a:t>
+              <a:t>‹#›</a:t>
             </a:fld>
             <a:endParaRPr lang="es-AR"/>
           </a:p>
@@ -760,7 +760,7 @@
     </p:spTree>
     <p:extLst>
       <p:ext uri="{BB962C8B-B14F-4D97-AF65-F5344CB8AC3E}">
-        <p14:creationId xmlns:p14="http://schemas.microsoft.com/office/powerpoint/2010/main" xmlns="" val="2387916325"/>
+        <p14:creationId xmlns:p14="http://schemas.microsoft.com/office/powerpoint/2010/main" val="2387916325"/>
       </p:ext>
     </p:extLst>
   </p:cSld>
@@ -923,7 +923,7 @@
             <a:fld id="{5D54C5B7-6535-45F6-B87D-0A10CE9C57BD}" type="slidenum">
               <a:rPr lang="es-AR" smtClean="0"/>
               <a:pPr/>
-              <a:t>‹Nº›</a:t>
+              <a:t>‹#›</a:t>
             </a:fld>
             <a:endParaRPr lang="es-AR"/>
           </a:p>
@@ -932,7 +932,7 @@
     </p:spTree>
     <p:extLst>
       <p:ext uri="{BB962C8B-B14F-4D97-AF65-F5344CB8AC3E}">
-        <p14:creationId xmlns:p14="http://schemas.microsoft.com/office/powerpoint/2010/main" xmlns="" val="599926953"/>
+        <p14:creationId xmlns:p14="http://schemas.microsoft.com/office/powerpoint/2010/main" val="599926953"/>
       </p:ext>
     </p:extLst>
   </p:cSld>
@@ -1105,7 +1105,7 @@
             <a:fld id="{5D54C5B7-6535-45F6-B87D-0A10CE9C57BD}" type="slidenum">
               <a:rPr lang="es-AR" smtClean="0"/>
               <a:pPr/>
-              <a:t>‹Nº›</a:t>
+              <a:t>‹#›</a:t>
             </a:fld>
             <a:endParaRPr lang="es-AR"/>
           </a:p>
@@ -1114,7 +1114,7 @@
     </p:spTree>
     <p:extLst>
       <p:ext uri="{BB962C8B-B14F-4D97-AF65-F5344CB8AC3E}">
-        <p14:creationId xmlns:p14="http://schemas.microsoft.com/office/powerpoint/2010/main" xmlns="" val="1132530867"/>
+        <p14:creationId xmlns:p14="http://schemas.microsoft.com/office/powerpoint/2010/main" val="1132530867"/>
       </p:ext>
     </p:extLst>
   </p:cSld>
@@ -1277,7 +1277,7 @@
             <a:fld id="{5D54C5B7-6535-45F6-B87D-0A10CE9C57BD}" type="slidenum">
               <a:rPr lang="es-AR" smtClean="0"/>
               <a:pPr/>
-              <a:t>‹Nº›</a:t>
+              <a:t>‹#›</a:t>
             </a:fld>
             <a:endParaRPr lang="es-AR"/>
           </a:p>
@@ -1286,7 +1286,7 @@
     </p:spTree>
     <p:extLst>
       <p:ext uri="{BB962C8B-B14F-4D97-AF65-F5344CB8AC3E}">
-        <p14:creationId xmlns:p14="http://schemas.microsoft.com/office/powerpoint/2010/main" xmlns="" val="3486428753"/>
+        <p14:creationId xmlns:p14="http://schemas.microsoft.com/office/powerpoint/2010/main" val="3486428753"/>
       </p:ext>
     </p:extLst>
   </p:cSld>
@@ -1535,7 +1535,7 @@
             <a:fld id="{5D54C5B7-6535-45F6-B87D-0A10CE9C57BD}" type="slidenum">
               <a:rPr lang="es-AR" smtClean="0"/>
               <a:pPr/>
-              <a:t>‹Nº›</a:t>
+              <a:t>‹#›</a:t>
             </a:fld>
             <a:endParaRPr lang="es-AR"/>
           </a:p>
@@ -1544,7 +1544,7 @@
     </p:spTree>
     <p:extLst>
       <p:ext uri="{BB962C8B-B14F-4D97-AF65-F5344CB8AC3E}">
-        <p14:creationId xmlns:p14="http://schemas.microsoft.com/office/powerpoint/2010/main" xmlns="" val="2001868568"/>
+        <p14:creationId xmlns:p14="http://schemas.microsoft.com/office/powerpoint/2010/main" val="2001868568"/>
       </p:ext>
     </p:extLst>
   </p:cSld>
@@ -1825,7 +1825,7 @@
             <a:fld id="{5D54C5B7-6535-45F6-B87D-0A10CE9C57BD}" type="slidenum">
               <a:rPr lang="es-AR" smtClean="0"/>
               <a:pPr/>
-              <a:t>‹Nº›</a:t>
+              <a:t>‹#›</a:t>
             </a:fld>
             <a:endParaRPr lang="es-AR"/>
           </a:p>
@@ -1834,7 +1834,7 @@
     </p:spTree>
     <p:extLst>
       <p:ext uri="{BB962C8B-B14F-4D97-AF65-F5344CB8AC3E}">
-        <p14:creationId xmlns:p14="http://schemas.microsoft.com/office/powerpoint/2010/main" xmlns="" val="645645608"/>
+        <p14:creationId xmlns:p14="http://schemas.microsoft.com/office/powerpoint/2010/main" val="645645608"/>
       </p:ext>
     </p:extLst>
   </p:cSld>
@@ -2265,7 +2265,7 @@
             <a:fld id="{5D54C5B7-6535-45F6-B87D-0A10CE9C57BD}" type="slidenum">
               <a:rPr lang="es-AR" smtClean="0"/>
               <a:pPr/>
-              <a:t>‹Nº›</a:t>
+              <a:t>‹#›</a:t>
             </a:fld>
             <a:endParaRPr lang="es-AR"/>
           </a:p>
@@ -2274,7 +2274,7 @@
     </p:spTree>
     <p:extLst>
       <p:ext uri="{BB962C8B-B14F-4D97-AF65-F5344CB8AC3E}">
-        <p14:creationId xmlns:p14="http://schemas.microsoft.com/office/powerpoint/2010/main" xmlns="" val="532310638"/>
+        <p14:creationId xmlns:p14="http://schemas.microsoft.com/office/powerpoint/2010/main" val="532310638"/>
       </p:ext>
     </p:extLst>
   </p:cSld>
@@ -2385,7 +2385,7 @@
             <a:fld id="{5D54C5B7-6535-45F6-B87D-0A10CE9C57BD}" type="slidenum">
               <a:rPr lang="es-AR" smtClean="0"/>
               <a:pPr/>
-              <a:t>‹Nº›</a:t>
+              <a:t>‹#›</a:t>
             </a:fld>
             <a:endParaRPr lang="es-AR"/>
           </a:p>
@@ -2394,7 +2394,7 @@
     </p:spTree>
     <p:extLst>
       <p:ext uri="{BB962C8B-B14F-4D97-AF65-F5344CB8AC3E}">
-        <p14:creationId xmlns:p14="http://schemas.microsoft.com/office/powerpoint/2010/main" xmlns="" val="2854672547"/>
+        <p14:creationId xmlns:p14="http://schemas.microsoft.com/office/powerpoint/2010/main" val="2854672547"/>
       </p:ext>
     </p:extLst>
   </p:cSld>
@@ -2482,7 +2482,7 @@
             <a:fld id="{5D54C5B7-6535-45F6-B87D-0A10CE9C57BD}" type="slidenum">
               <a:rPr lang="es-AR" smtClean="0"/>
               <a:pPr/>
-              <a:t>‹Nº›</a:t>
+              <a:t>‹#›</a:t>
             </a:fld>
             <a:endParaRPr lang="es-AR"/>
           </a:p>
@@ -2491,7 +2491,7 @@
     </p:spTree>
     <p:extLst>
       <p:ext uri="{BB962C8B-B14F-4D97-AF65-F5344CB8AC3E}">
-        <p14:creationId xmlns:p14="http://schemas.microsoft.com/office/powerpoint/2010/main" xmlns="" val="1207526025"/>
+        <p14:creationId xmlns:p14="http://schemas.microsoft.com/office/powerpoint/2010/main" val="1207526025"/>
       </p:ext>
     </p:extLst>
   </p:cSld>
@@ -2850,7 +2850,7 @@
             <a:fld id="{5D54C5B7-6535-45F6-B87D-0A10CE9C57BD}" type="slidenum">
               <a:rPr lang="es-AR" smtClean="0"/>
               <a:pPr/>
-              <a:t>‹Nº›</a:t>
+              <a:t>‹#›</a:t>
             </a:fld>
             <a:endParaRPr lang="es-AR"/>
           </a:p>
@@ -2859,7 +2859,7 @@
     </p:spTree>
     <p:extLst>
       <p:ext uri="{BB962C8B-B14F-4D97-AF65-F5344CB8AC3E}">
-        <p14:creationId xmlns:p14="http://schemas.microsoft.com/office/powerpoint/2010/main" xmlns="" val="692071596"/>
+        <p14:creationId xmlns:p14="http://schemas.microsoft.com/office/powerpoint/2010/main" val="692071596"/>
       </p:ext>
     </p:extLst>
   </p:cSld>
@@ -3181,7 +3181,7 @@
             <a:fld id="{5D54C5B7-6535-45F6-B87D-0A10CE9C57BD}" type="slidenum">
               <a:rPr lang="es-AR" smtClean="0"/>
               <a:pPr/>
-              <a:t>‹Nº›</a:t>
+              <a:t>‹#›</a:t>
             </a:fld>
             <a:endParaRPr lang="es-AR"/>
           </a:p>
@@ -3190,7 +3190,7 @@
     </p:spTree>
     <p:extLst>
       <p:ext uri="{BB962C8B-B14F-4D97-AF65-F5344CB8AC3E}">
-        <p14:creationId xmlns:p14="http://schemas.microsoft.com/office/powerpoint/2010/main" xmlns="" val="975840812"/>
+        <p14:creationId xmlns:p14="http://schemas.microsoft.com/office/powerpoint/2010/main" val="975840812"/>
       </p:ext>
     </p:extLst>
   </p:cSld>
@@ -3436,7 +3436,7 @@
             <a:fld id="{5D54C5B7-6535-45F6-B87D-0A10CE9C57BD}" type="slidenum">
               <a:rPr lang="es-AR" smtClean="0"/>
               <a:pPr/>
-              <a:t>‹Nº›</a:t>
+              <a:t>‹#›</a:t>
             </a:fld>
             <a:endParaRPr lang="es-AR"/>
           </a:p>
@@ -3445,7 +3445,7 @@
     </p:spTree>
     <p:extLst>
       <p:ext uri="{BB962C8B-B14F-4D97-AF65-F5344CB8AC3E}">
-        <p14:creationId xmlns:p14="http://schemas.microsoft.com/office/powerpoint/2010/main" xmlns="" val="4148694763"/>
+        <p14:creationId xmlns:p14="http://schemas.microsoft.com/office/powerpoint/2010/main" val="4148694763"/>
       </p:ext>
     </p:extLst>
   </p:cSld>
@@ -4056,7 +4056,7 @@
             </a:r>
             <a:r>
               <a:rPr lang="es-AR" sz="3200" dirty="0"/>
-              <a:t>separados y se </a:t>
+              <a:t>separados y </a:t>
             </a:r>
             <a:r>
               <a:rPr lang="es-AR" sz="3200" dirty="0" smtClean="0"/>
@@ -4068,8 +4068,9 @@
             </a:r>
             <a:r>
               <a:rPr lang="es-AR" sz="3200" dirty="0" smtClean="0"/>
-              <a:t>bloqueados</a:t>
-            </a:r>
+              <a:t>bloqueados.</a:t>
+            </a:r>
+            <a:endParaRPr lang="es-AR" sz="3200" dirty="0" smtClean="0"/>
           </a:p>
           <a:p>
             <a:pPr marL="271463" indent="-271463">
@@ -4094,7 +4095,7 @@
             </a:r>
             <a:r>
               <a:rPr lang="en-US" sz="3200" dirty="0" err="1" smtClean="0"/>
-              <a:t>reporte</a:t>
+              <a:t>informe</a:t>
             </a:r>
             <a:r>
               <a:rPr lang="en-US" sz="3200" dirty="0" smtClean="0"/>
@@ -4106,35 +4107,75 @@
             </a:r>
             <a:r>
               <a:rPr lang="en-US" sz="3200" dirty="0" smtClean="0"/>
-              <a:t>, el </a:t>
+              <a:t>, </a:t>
+            </a:r>
+            <a:r>
+              <a:rPr lang="en-US" sz="3200" dirty="0" smtClean="0"/>
+              <a:t>con </a:t>
+            </a:r>
+            <a:r>
+              <a:rPr lang="en-US" sz="3200" dirty="0" err="1" smtClean="0"/>
+              <a:t>orientación</a:t>
+            </a:r>
+            <a:r>
+              <a:rPr lang="en-US" sz="3200" dirty="0" smtClean="0"/>
+              <a:t> a </a:t>
+            </a:r>
+            <a:r>
+              <a:rPr lang="en-US" sz="3200" dirty="0" err="1" smtClean="0"/>
+              <a:t>funcionalidades</a:t>
+            </a:r>
+            <a:r>
+              <a:rPr lang="en-US" sz="3200" dirty="0" smtClean="0"/>
+              <a:t> </a:t>
+            </a:r>
+            <a:r>
+              <a:rPr lang="en-US" sz="3200" dirty="0" err="1" smtClean="0"/>
+              <a:t>completas</a:t>
+            </a:r>
+            <a:r>
+              <a:rPr lang="en-US" sz="3200" dirty="0" smtClean="0"/>
+              <a:t> y no </a:t>
+            </a:r>
+            <a:r>
+              <a:rPr lang="en-US" sz="3200" dirty="0" err="1" smtClean="0"/>
+              <a:t>tanto</a:t>
+            </a:r>
+            <a:r>
+              <a:rPr lang="en-US" sz="3200" dirty="0" smtClean="0"/>
+              <a:t> a </a:t>
+            </a:r>
+            <a:r>
+              <a:rPr lang="en-US" sz="3200" dirty="0" err="1" smtClean="0"/>
+              <a:t>detalles</a:t>
+            </a:r>
+            <a:r>
+              <a:rPr lang="en-US" sz="3200" dirty="0" smtClean="0"/>
+              <a:t> </a:t>
+            </a:r>
+            <a:r>
+              <a:rPr lang="en-US" sz="3200" dirty="0" err="1" smtClean="0"/>
+              <a:t>internos</a:t>
+            </a:r>
+            <a:r>
+              <a:rPr lang="en-US" sz="3200" dirty="0"/>
+              <a:t> </a:t>
+            </a:r>
+            <a:r>
+              <a:rPr lang="en-US" sz="3200" dirty="0" smtClean="0"/>
+              <a:t>para no </a:t>
+            </a:r>
+            <a:r>
+              <a:rPr lang="en-US" sz="3200" dirty="0" err="1" smtClean="0"/>
+              <a:t>agobiar</a:t>
+            </a:r>
+            <a:r>
+              <a:rPr lang="en-US" sz="3200" dirty="0" smtClean="0"/>
+              <a:t> al </a:t>
             </a:r>
             <a:r>
               <a:rPr lang="en-US" sz="3200" dirty="0" err="1" smtClean="0"/>
               <a:t>cliente</a:t>
-            </a:r>
-            <a:r>
-              <a:rPr lang="en-US" sz="3200" dirty="0" smtClean="0"/>
-              <a:t> no </a:t>
-            </a:r>
-            <a:r>
-              <a:rPr lang="en-US" sz="3200" dirty="0" err="1" smtClean="0"/>
-              <a:t>llegaba</a:t>
-            </a:r>
-            <a:r>
-              <a:rPr lang="en-US" sz="3200" dirty="0" smtClean="0"/>
-              <a:t> a </a:t>
-            </a:r>
-            <a:r>
-              <a:rPr lang="en-US" sz="3200" dirty="0" err="1" smtClean="0"/>
-              <a:t>consumir</a:t>
-            </a:r>
-            <a:r>
-              <a:rPr lang="en-US" sz="3200" dirty="0" smtClean="0"/>
-              <a:t> </a:t>
-            </a:r>
-            <a:r>
-              <a:rPr lang="en-US" sz="3200" dirty="0" err="1" smtClean="0"/>
-              <a:t>todos</a:t>
             </a:r>
             <a:r>
               <a:rPr lang="en-US" sz="3200" dirty="0" smtClean="0"/>
@@ -4154,7 +4195,7 @@
     </p:spTree>
     <p:extLst>
       <p:ext uri="{BB962C8B-B14F-4D97-AF65-F5344CB8AC3E}">
-        <p14:creationId xmlns:p14="http://schemas.microsoft.com/office/powerpoint/2010/main" xmlns="" val="3602608099"/>
+        <p14:creationId xmlns:p14="http://schemas.microsoft.com/office/powerpoint/2010/main" val="3602608099"/>
       </p:ext>
     </p:extLst>
   </p:cSld>
@@ -4414,11 +4455,15 @@
             <a:pPr algn="ctr"/>
             <a:r>
               <a:rPr lang="es-AR" dirty="0" err="1" smtClean="0"/>
-              <a:t>BurnDown</a:t>
+              <a:t>Burndown</a:t>
             </a:r>
             <a:r>
               <a:rPr lang="es-AR" dirty="0" smtClean="0"/>
-              <a:t> Chart	</a:t>
+              <a:t> </a:t>
+            </a:r>
+            <a:r>
+              <a:rPr lang="es-AR" dirty="0" smtClean="0"/>
+              <a:t>Chart	</a:t>
             </a:r>
             <a:endParaRPr lang="es-AR" dirty="0"/>
           </a:p>
@@ -4961,7 +5006,7 @@
     </p:spTree>
     <p:extLst>
       <p:ext uri="{BB962C8B-B14F-4D97-AF65-F5344CB8AC3E}">
-        <p14:creationId xmlns:p14="http://schemas.microsoft.com/office/powerpoint/2010/main" xmlns="" val="3682612548"/>
+        <p14:creationId xmlns:p14="http://schemas.microsoft.com/office/powerpoint/2010/main" val="3682612548"/>
       </p:ext>
     </p:extLst>
   </p:cSld>
@@ -5092,7 +5137,7 @@
     </p:spTree>
     <p:extLst>
       <p:ext uri="{BB962C8B-B14F-4D97-AF65-F5344CB8AC3E}">
-        <p14:creationId xmlns:p14="http://schemas.microsoft.com/office/powerpoint/2010/main" xmlns="" val="1118828118"/>
+        <p14:creationId xmlns:p14="http://schemas.microsoft.com/office/powerpoint/2010/main" val="1118828118"/>
       </p:ext>
     </p:extLst>
   </p:cSld>
@@ -5183,20 +5228,21 @@
             </a:pPr>
             <a:r>
               <a:rPr lang="en-US" sz="3200" dirty="0" err="1" smtClean="0"/>
-              <a:t>Objetivo</a:t>
+              <a:t>Reuniones</a:t>
             </a:r>
             <a:r>
               <a:rPr lang="en-US" sz="3200" dirty="0" smtClean="0"/>
-              <a:t> reunions </a:t>
+              <a:t> - </a:t>
             </a:r>
             <a:r>
               <a:rPr lang="en-US" sz="3200" dirty="0" err="1" smtClean="0"/>
-              <a:t>planeamiento</a:t>
+              <a:t>Planeamiento</a:t>
             </a:r>
             <a:r>
               <a:rPr lang="en-US" sz="3200" dirty="0" smtClean="0"/>
               <a:t>: </a:t>
             </a:r>
+            <a:endParaRPr lang="en-US" sz="3200" dirty="0" smtClean="0"/>
           </a:p>
           <a:p>
             <a:pPr marL="971550" lvl="2" indent="-514350">
@@ -5338,6 +5384,14 @@
             <a:r>
               <a:rPr lang="en-US" sz="2800" dirty="0" err="1" smtClean="0"/>
               <a:t>definido</a:t>
+            </a:r>
+            <a:r>
+              <a:rPr lang="en-US" sz="2800" dirty="0" smtClean="0"/>
+              <a:t> </a:t>
+            </a:r>
+            <a:r>
+              <a:rPr lang="en-US" sz="2800" dirty="0" err="1" smtClean="0"/>
+              <a:t>aprobado</a:t>
             </a:r>
             <a:endParaRPr lang="es-AR" sz="2800" dirty="0" smtClean="0"/>
           </a:p>
@@ -5599,7 +5653,7 @@
   <a:extraClrSchemeLst/>
   <a:extLst>
     <a:ext uri="{05A4C25C-085E-4340-85A3-A5531E510DB2}">
-      <thm15:themeFamily xmlns:thm15="http://schemas.microsoft.com/office/thememl/2012/main" xmlns="" name="Metropolitan" id="{4C5440D6-04D2-4954-96CF-F251137069B2}" vid="{79CFCA13-9412-4290-BB4B-85112F88857B}"/>
+      <thm15:themeFamily xmlns:thm15="http://schemas.microsoft.com/office/thememl/2012/main" name="Metropolitan" id="{4C5440D6-04D2-4954-96CF-F251137069B2}" vid="{79CFCA13-9412-4290-BB4B-85112F88857B}"/>
     </a:ext>
   </a:extLst>
 </a:theme>
@@ -5860,7 +5914,7 @@
   <a:extraClrSchemeLst/>
   <a:extLst>
     <a:ext uri="{05A4C25C-085E-4340-85A3-A5531E510DB2}">
-      <thm15:themeFamily xmlns:thm15="http://schemas.microsoft.com/office/thememl/2012/main" xmlns="" name="Office Theme" id="{62F939B6-93AF-4DB8-9C6B-D6C7DFDC589F}" vid="{4A3C46E8-61CC-4603-A589-7422A47A8E4A}"/>
+      <thm15:themeFamily xmlns:thm15="http://schemas.microsoft.com/office/thememl/2012/main" name="Office Theme" id="{62F939B6-93AF-4DB8-9C6B-D6C7DFDC589F}" vid="{4A3C46E8-61CC-4603-A589-7422A47A8E4A}"/>
     </a:ext>
   </a:extLst>
 </a:theme>

</xml_diff>